<commit_message>
increase minimum layers for coarse settings
</commit_message>
<xml_diff>
--- a/ampersandCFD-software-development-notes.pptx
+++ b/ampersandCFD-software-development-notes.pptx
@@ -10,6 +10,7 @@
     <p:sldId id="258" r:id="rId4"/>
     <p:sldId id="259" r:id="rId5"/>
     <p:sldId id="260" r:id="rId6"/>
+    <p:sldId id="261" r:id="rId7"/>
   </p:sldIdLst>
   <p:sldSz cx="12192000" cy="6858000"/>
   <p:notesSz cx="6858000" cy="9144000"/>
@@ -265,7 +266,7 @@
           <a:p>
             <a:fld id="{7D321363-94F3-2B42-B238-F4902FA535FF}" type="datetimeFigureOut">
               <a:rPr lang="en-JP" smtClean="0"/>
-              <a:t>2024/08/22</a:t>
+              <a:t>11/06/2024</a:t>
             </a:fld>
             <a:endParaRPr lang="en-JP"/>
           </a:p>
@@ -465,7 +466,7 @@
           <a:p>
             <a:fld id="{7D321363-94F3-2B42-B238-F4902FA535FF}" type="datetimeFigureOut">
               <a:rPr lang="en-JP" smtClean="0"/>
-              <a:t>2024/08/22</a:t>
+              <a:t>11/06/2024</a:t>
             </a:fld>
             <a:endParaRPr lang="en-JP"/>
           </a:p>
@@ -675,7 +676,7 @@
           <a:p>
             <a:fld id="{7D321363-94F3-2B42-B238-F4902FA535FF}" type="datetimeFigureOut">
               <a:rPr lang="en-JP" smtClean="0"/>
-              <a:t>2024/08/22</a:t>
+              <a:t>11/06/2024</a:t>
             </a:fld>
             <a:endParaRPr lang="en-JP"/>
           </a:p>
@@ -875,7 +876,7 @@
           <a:p>
             <a:fld id="{7D321363-94F3-2B42-B238-F4902FA535FF}" type="datetimeFigureOut">
               <a:rPr lang="en-JP" smtClean="0"/>
-              <a:t>2024/08/22</a:t>
+              <a:t>11/06/2024</a:t>
             </a:fld>
             <a:endParaRPr lang="en-JP"/>
           </a:p>
@@ -1151,7 +1152,7 @@
           <a:p>
             <a:fld id="{7D321363-94F3-2B42-B238-F4902FA535FF}" type="datetimeFigureOut">
               <a:rPr lang="en-JP" smtClean="0"/>
-              <a:t>2024/08/22</a:t>
+              <a:t>11/06/2024</a:t>
             </a:fld>
             <a:endParaRPr lang="en-JP"/>
           </a:p>
@@ -1419,7 +1420,7 @@
           <a:p>
             <a:fld id="{7D321363-94F3-2B42-B238-F4902FA535FF}" type="datetimeFigureOut">
               <a:rPr lang="en-JP" smtClean="0"/>
-              <a:t>2024/08/22</a:t>
+              <a:t>11/06/2024</a:t>
             </a:fld>
             <a:endParaRPr lang="en-JP"/>
           </a:p>
@@ -1834,7 +1835,7 @@
           <a:p>
             <a:fld id="{7D321363-94F3-2B42-B238-F4902FA535FF}" type="datetimeFigureOut">
               <a:rPr lang="en-JP" smtClean="0"/>
-              <a:t>2024/08/22</a:t>
+              <a:t>11/06/2024</a:t>
             </a:fld>
             <a:endParaRPr lang="en-JP"/>
           </a:p>
@@ -1976,7 +1977,7 @@
           <a:p>
             <a:fld id="{7D321363-94F3-2B42-B238-F4902FA535FF}" type="datetimeFigureOut">
               <a:rPr lang="en-JP" smtClean="0"/>
-              <a:t>2024/08/22</a:t>
+              <a:t>11/06/2024</a:t>
             </a:fld>
             <a:endParaRPr lang="en-JP"/>
           </a:p>
@@ -2089,7 +2090,7 @@
           <a:p>
             <a:fld id="{7D321363-94F3-2B42-B238-F4902FA535FF}" type="datetimeFigureOut">
               <a:rPr lang="en-JP" smtClean="0"/>
-              <a:t>2024/08/22</a:t>
+              <a:t>11/06/2024</a:t>
             </a:fld>
             <a:endParaRPr lang="en-JP"/>
           </a:p>
@@ -2402,7 +2403,7 @@
           <a:p>
             <a:fld id="{7D321363-94F3-2B42-B238-F4902FA535FF}" type="datetimeFigureOut">
               <a:rPr lang="en-JP" smtClean="0"/>
-              <a:t>2024/08/22</a:t>
+              <a:t>11/06/2024</a:t>
             </a:fld>
             <a:endParaRPr lang="en-JP"/>
           </a:p>
@@ -2691,7 +2692,7 @@
           <a:p>
             <a:fld id="{7D321363-94F3-2B42-B238-F4902FA535FF}" type="datetimeFigureOut">
               <a:rPr lang="en-JP" smtClean="0"/>
-              <a:t>2024/08/22</a:t>
+              <a:t>11/06/2024</a:t>
             </a:fld>
             <a:endParaRPr lang="en-JP"/>
           </a:p>
@@ -2934,7 +2935,7 @@
           <a:p>
             <a:fld id="{7D321363-94F3-2B42-B238-F4902FA535FF}" type="datetimeFigureOut">
               <a:rPr lang="en-JP" smtClean="0"/>
-              <a:t>2024/08/22</a:t>
+              <a:t>11/06/2024</a:t>
             </a:fld>
             <a:endParaRPr lang="en-JP"/>
           </a:p>
@@ -3408,8 +3409,21 @@
           <a:p>
             <a:r>
               <a:rPr lang="en-JP" dirty="0"/>
-              <a:t>Modified: 2024/08/10</a:t>
-            </a:r>
+              <a:t>Modified: 2024/</a:t>
+            </a:r>
+            <a:r>
+              <a:rPr lang="en-US" dirty="0"/>
+              <a:t>11</a:t>
+            </a:r>
+            <a:r>
+              <a:rPr lang="en-JP" dirty="0"/>
+              <a:t>/</a:t>
+            </a:r>
+            <a:r>
+              <a:rPr lang="en-US" dirty="0"/>
+              <a:t>6</a:t>
+            </a:r>
+            <a:endParaRPr lang="en-JP" dirty="0"/>
           </a:p>
           <a:p>
             <a:r>
@@ -4189,6 +4203,137 @@
     <p:extLst>
       <p:ext uri="{BB962C8B-B14F-4D97-AF65-F5344CB8AC3E}">
         <p14:creationId xmlns:p14="http://schemas.microsoft.com/office/powerpoint/2010/main" val="605838694"/>
+      </p:ext>
+    </p:extLst>
+  </p:cSld>
+  <p:clrMapOvr>
+    <a:masterClrMapping/>
+  </p:clrMapOvr>
+</p:sld>
+</file>
+
+<file path=ppt/slides/slide6.xml><?xml version="1.0" encoding="utf-8"?>
+<p:sld xmlns:a="http://schemas.openxmlformats.org/drawingml/2006/main" xmlns:r="http://schemas.openxmlformats.org/officeDocument/2006/relationships" xmlns:p="http://schemas.openxmlformats.org/presentationml/2006/main">
+  <p:cSld>
+    <p:spTree>
+      <p:nvGrpSpPr>
+        <p:cNvPr id="1" name=""/>
+        <p:cNvGrpSpPr/>
+        <p:nvPr/>
+      </p:nvGrpSpPr>
+      <p:grpSpPr>
+        <a:xfrm>
+          <a:off x="0" y="0"/>
+          <a:ext cx="0" cy="0"/>
+          <a:chOff x="0" y="0"/>
+          <a:chExt cx="0" cy="0"/>
+        </a:xfrm>
+      </p:grpSpPr>
+      <p:sp>
+        <p:nvSpPr>
+          <p:cNvPr id="2" name="Title 1">
+            <a:extLst>
+              <a:ext uri="{FF2B5EF4-FFF2-40B4-BE49-F238E27FC236}">
+                <a16:creationId xmlns:a16="http://schemas.microsoft.com/office/drawing/2014/main" id="{09BBE3BB-C5AB-B5A4-9A8D-DB0E0F77BC0E}"/>
+              </a:ext>
+            </a:extLst>
+          </p:cNvPr>
+          <p:cNvSpPr>
+            <a:spLocks noGrp="1"/>
+          </p:cNvSpPr>
+          <p:nvPr>
+            <p:ph type="title"/>
+          </p:nvPr>
+        </p:nvSpPr>
+        <p:spPr/>
+        <p:txBody>
+          <a:bodyPr/>
+          <a:lstStyle/>
+          <a:p>
+            <a:r>
+              <a:rPr lang="en-US" dirty="0"/>
+              <a:t>Verification and Validation cases</a:t>
+            </a:r>
+          </a:p>
+        </p:txBody>
+      </p:sp>
+      <p:sp>
+        <p:nvSpPr>
+          <p:cNvPr id="3" name="Content Placeholder 2">
+            <a:extLst>
+              <a:ext uri="{FF2B5EF4-FFF2-40B4-BE49-F238E27FC236}">
+                <a16:creationId xmlns:a16="http://schemas.microsoft.com/office/drawing/2014/main" id="{49A3E94B-EF1F-9909-8D61-B9308B2767CB}"/>
+              </a:ext>
+            </a:extLst>
+          </p:cNvPr>
+          <p:cNvSpPr>
+            <a:spLocks noGrp="1"/>
+          </p:cNvSpPr>
+          <p:nvPr>
+            <p:ph idx="1"/>
+          </p:nvPr>
+        </p:nvSpPr>
+        <p:spPr/>
+        <p:txBody>
+          <a:bodyPr/>
+          <a:lstStyle/>
+          <a:p>
+            <a:r>
+              <a:rPr lang="en-US" dirty="0"/>
+              <a:t>Internal flows</a:t>
+            </a:r>
+          </a:p>
+          <a:p>
+            <a:pPr lvl="1"/>
+            <a:r>
+              <a:rPr lang="en-US" dirty="0"/>
+              <a:t>Flow inside a pipe </a:t>
+            </a:r>
+          </a:p>
+          <a:p>
+            <a:pPr lvl="1"/>
+            <a:r>
+              <a:rPr lang="en-US" dirty="0"/>
+              <a:t>Flow inside a Venturi</a:t>
+            </a:r>
+          </a:p>
+          <a:p>
+            <a:pPr lvl="1"/>
+            <a:r>
+              <a:rPr lang="en-US" dirty="0"/>
+              <a:t>Flow inside a centrifugal pump</a:t>
+            </a:r>
+          </a:p>
+          <a:p>
+            <a:r>
+              <a:rPr lang="en-US" dirty="0"/>
+              <a:t>External flows</a:t>
+            </a:r>
+          </a:p>
+          <a:p>
+            <a:pPr lvl="1"/>
+            <a:r>
+              <a:rPr lang="en-US" dirty="0"/>
+              <a:t>Flow around a sphere </a:t>
+            </a:r>
+          </a:p>
+          <a:p>
+            <a:pPr lvl="1"/>
+            <a:r>
+              <a:rPr lang="en-US" dirty="0"/>
+              <a:t>Flow around Ahmed body</a:t>
+            </a:r>
+          </a:p>
+          <a:p>
+            <a:pPr lvl="1"/>
+            <a:endParaRPr lang="en-US" dirty="0"/>
+          </a:p>
+        </p:txBody>
+      </p:sp>
+    </p:spTree>
+    <p:extLst>
+      <p:ext uri="{BB962C8B-B14F-4D97-AF65-F5344CB8AC3E}">
+        <p14:creationId xmlns:p14="http://schemas.microsoft.com/office/powerpoint/2010/main" val="4175798670"/>
       </p:ext>
     </p:extLst>
   </p:cSld>

</xml_diff>